<commit_message>
Added base ios framework and demo
</commit_message>
<xml_diff>
--- a/Architecture/Diagrams.pptx
+++ b/Architecture/Diagrams.pptx
@@ -17015,9 +17015,23 @@
           <a:p>
             <a:pPr algn="ctr"/>
             <a:r>
-              <a:rPr lang="es-MX" sz="2000" b="1" dirty="0"/>
+              <a:rPr lang="es-MX" sz="3600" b="1" dirty="0"/>
               <a:t>MCV</a:t>
             </a:r>
+            <a:br>
+              <a:rPr lang="es-MX" dirty="0"/>
+            </a:br>
+            <a:endParaRPr lang="es-MX" dirty="0"/>
+          </a:p>
+          <a:p>
+            <a:pPr algn="ctr"/>
+            <a:r>
+              <a:rPr lang="es-MX" dirty="0"/>
+              <a:t>Mobile Computer Vision</a:t>
+            </a:r>
+          </a:p>
+          <a:p>
+            <a:pPr algn="ctr"/>
             <a:endParaRPr lang="es-MX" b="1" dirty="0"/>
           </a:p>
         </p:txBody>
@@ -17710,6 +17724,112 @@
             <a:r>
               <a:rPr lang="es-MX" dirty="0"/>
               <a:t>Image</a:t>
+            </a:r>
+          </a:p>
+        </p:txBody>
+      </p:sp>
+      <p:sp>
+        <p:nvSpPr>
+          <p:cNvPr id="19" name="Rectángulo redondeado 18">
+            <a:extLst>
+              <a:ext uri="{FF2B5EF4-FFF2-40B4-BE49-F238E27FC236}">
+                <a16:creationId xmlns:a16="http://schemas.microsoft.com/office/drawing/2014/main" id="{A3B0A3C6-FA80-5D40-98BA-375277016EEB}"/>
+              </a:ext>
+            </a:extLst>
+          </p:cNvPr>
+          <p:cNvSpPr/>
+          <p:nvPr/>
+        </p:nvSpPr>
+        <p:spPr>
+          <a:xfrm>
+            <a:off x="8315132" y="2839019"/>
+            <a:ext cx="2273644" cy="319806"/>
+          </a:xfrm>
+          <a:prstGeom prst="roundRect">
+            <a:avLst/>
+          </a:prstGeom>
+          <a:solidFill>
+            <a:schemeClr val="accent1"/>
+          </a:solidFill>
+          <a:ln>
+            <a:noFill/>
+          </a:ln>
+        </p:spPr>
+        <p:style>
+          <a:lnRef idx="0">
+            <a:scrgbClr r="0" g="0" b="0"/>
+          </a:lnRef>
+          <a:fillRef idx="0">
+            <a:scrgbClr r="0" g="0" b="0"/>
+          </a:fillRef>
+          <a:effectRef idx="0">
+            <a:scrgbClr r="0" g="0" b="0"/>
+          </a:effectRef>
+          <a:fontRef idx="minor">
+            <a:schemeClr val="lt1"/>
+          </a:fontRef>
+        </p:style>
+        <p:txBody>
+          <a:bodyPr rtlCol="0" anchor="ctr"/>
+          <a:lstStyle/>
+          <a:p>
+            <a:pPr algn="ctr"/>
+            <a:r>
+              <a:rPr lang="es-MX" dirty="0"/>
+              <a:t>Parameters</a:t>
+            </a:r>
+          </a:p>
+        </p:txBody>
+      </p:sp>
+      <p:sp>
+        <p:nvSpPr>
+          <p:cNvPr id="20" name="Rectángulo redondeado 19">
+            <a:extLst>
+              <a:ext uri="{FF2B5EF4-FFF2-40B4-BE49-F238E27FC236}">
+                <a16:creationId xmlns:a16="http://schemas.microsoft.com/office/drawing/2014/main" id="{4D7D8D5C-4927-CE4F-8AF9-D6DB809C455C}"/>
+              </a:ext>
+            </a:extLst>
+          </p:cNvPr>
+          <p:cNvSpPr/>
+          <p:nvPr/>
+        </p:nvSpPr>
+        <p:spPr>
+          <a:xfrm>
+            <a:off x="8315131" y="3663464"/>
+            <a:ext cx="2273644" cy="319806"/>
+          </a:xfrm>
+          <a:prstGeom prst="roundRect">
+            <a:avLst/>
+          </a:prstGeom>
+          <a:solidFill>
+            <a:schemeClr val="accent1"/>
+          </a:solidFill>
+          <a:ln>
+            <a:noFill/>
+          </a:ln>
+        </p:spPr>
+        <p:style>
+          <a:lnRef idx="0">
+            <a:scrgbClr r="0" g="0" b="0"/>
+          </a:lnRef>
+          <a:fillRef idx="0">
+            <a:scrgbClr r="0" g="0" b="0"/>
+          </a:fillRef>
+          <a:effectRef idx="0">
+            <a:scrgbClr r="0" g="0" b="0"/>
+          </a:effectRef>
+          <a:fontRef idx="minor">
+            <a:schemeClr val="lt1"/>
+          </a:fontRef>
+        </p:style>
+        <p:txBody>
+          <a:bodyPr rtlCol="0" anchor="ctr"/>
+          <a:lstStyle/>
+          <a:p>
+            <a:pPr algn="ctr"/>
+            <a:r>
+              <a:rPr lang="es-MX" dirty="0"/>
+              <a:t>Parameters</a:t>
             </a:r>
           </a:p>
         </p:txBody>

</xml_diff>